<commit_message>
docs(progress_log) : updated for next week
docs(progress_log) : updated for next week
</commit_message>
<xml_diff>
--- a/presentations/progress_log.pptx
+++ b/presentations/progress_log.pptx
@@ -13,9 +13,6 @@
     <p:sldId id="261" r:id="rId7"/>
     <p:sldId id="262" r:id="rId8"/>
     <p:sldId id="263" r:id="rId9"/>
-    <p:sldId id="264" r:id="rId10"/>
-    <p:sldId id="265" r:id="rId11"/>
-    <p:sldId id="266" r:id="rId12"/>
   </p:sldIdLst>
   <p:sldSz cx="9144000" cy="6858000" type="screen4x3"/>
   <p:notesSz cx="6858000" cy="9144000"/>
@@ -352,7 +349,7 @@
           <a:p>
             <a:fld id="{BE740BB2-E612-45CF-96A8-BE4D5B63A40C}" type="datetimeFigureOut">
               <a:rPr lang="nl-NL" smtClean="0"/>
-              <a:t>7-3-2017</a:t>
+              <a:t>10-3-2017</a:t>
             </a:fld>
             <a:endParaRPr lang="nl-NL"/>
           </a:p>
@@ -416,7 +413,7 @@
           <a:p>
             <a:fld id="{89D9F315-EBDF-47D1-A5C3-A0643337B848}" type="slidenum">
               <a:rPr lang="nl-NL" smtClean="0"/>
-              <a:t>‹#›</a:t>
+              <a:t>‹nr.›</a:t>
             </a:fld>
             <a:endParaRPr lang="nl-NL"/>
           </a:p>
@@ -539,7 +536,7 @@
           <a:p>
             <a:fld id="{BE740BB2-E612-45CF-96A8-BE4D5B63A40C}" type="datetimeFigureOut">
               <a:rPr lang="nl-NL" smtClean="0"/>
-              <a:t>7-3-2017</a:t>
+              <a:t>10-3-2017</a:t>
             </a:fld>
             <a:endParaRPr lang="nl-NL"/>
           </a:p>
@@ -581,7 +578,7 @@
           <a:p>
             <a:fld id="{89D9F315-EBDF-47D1-A5C3-A0643337B848}" type="slidenum">
               <a:rPr lang="nl-NL" smtClean="0"/>
-              <a:t>‹#›</a:t>
+              <a:t>‹nr.›</a:t>
             </a:fld>
             <a:endParaRPr lang="nl-NL"/>
           </a:p>
@@ -714,7 +711,7 @@
           <a:p>
             <a:fld id="{BE740BB2-E612-45CF-96A8-BE4D5B63A40C}" type="datetimeFigureOut">
               <a:rPr lang="nl-NL" smtClean="0"/>
-              <a:t>7-3-2017</a:t>
+              <a:t>10-3-2017</a:t>
             </a:fld>
             <a:endParaRPr lang="nl-NL"/>
           </a:p>
@@ -756,7 +753,7 @@
           <a:p>
             <a:fld id="{89D9F315-EBDF-47D1-A5C3-A0643337B848}" type="slidenum">
               <a:rPr lang="nl-NL" smtClean="0"/>
-              <a:t>‹#›</a:t>
+              <a:t>‹nr.›</a:t>
             </a:fld>
             <a:endParaRPr lang="nl-NL"/>
           </a:p>
@@ -894,7 +891,7 @@
           <a:p>
             <a:fld id="{BE740BB2-E612-45CF-96A8-BE4D5B63A40C}" type="datetimeFigureOut">
               <a:rPr lang="nl-NL" smtClean="0"/>
-              <a:t>7-3-2017</a:t>
+              <a:t>10-3-2017</a:t>
             </a:fld>
             <a:endParaRPr lang="nl-NL"/>
           </a:p>
@@ -941,7 +938,7 @@
           <a:p>
             <a:fld id="{89D9F315-EBDF-47D1-A5C3-A0643337B848}" type="slidenum">
               <a:rPr lang="nl-NL" smtClean="0"/>
-              <a:t>‹#›</a:t>
+              <a:t>‹nr.›</a:t>
             </a:fld>
             <a:endParaRPr lang="nl-NL"/>
           </a:p>
@@ -1141,7 +1138,7 @@
           <a:p>
             <a:fld id="{BE740BB2-E612-45CF-96A8-BE4D5B63A40C}" type="datetimeFigureOut">
               <a:rPr lang="nl-NL" smtClean="0"/>
-              <a:t>7-3-2017</a:t>
+              <a:t>10-3-2017</a:t>
             </a:fld>
             <a:endParaRPr lang="nl-NL"/>
           </a:p>
@@ -1193,7 +1190,7 @@
           <a:p>
             <a:fld id="{89D9F315-EBDF-47D1-A5C3-A0643337B848}" type="slidenum">
               <a:rPr lang="nl-NL" smtClean="0"/>
-              <a:t>‹#›</a:t>
+              <a:t>‹nr.›</a:t>
             </a:fld>
             <a:endParaRPr lang="nl-NL"/>
           </a:p>
@@ -1615,7 +1612,7 @@
           <a:p>
             <a:fld id="{BE740BB2-E612-45CF-96A8-BE4D5B63A40C}" type="datetimeFigureOut">
               <a:rPr lang="nl-NL" smtClean="0"/>
-              <a:t>7-3-2017</a:t>
+              <a:t>10-3-2017</a:t>
             </a:fld>
             <a:endParaRPr lang="nl-NL"/>
           </a:p>
@@ -1667,7 +1664,7 @@
           <a:p>
             <a:fld id="{89D9F315-EBDF-47D1-A5C3-A0643337B848}" type="slidenum">
               <a:rPr lang="nl-NL" smtClean="0"/>
-              <a:t>‹#›</a:t>
+              <a:t>‹nr.›</a:t>
             </a:fld>
             <a:endParaRPr lang="nl-NL"/>
           </a:p>
@@ -2030,7 +2027,7 @@
           <a:p>
             <a:fld id="{BE740BB2-E612-45CF-96A8-BE4D5B63A40C}" type="datetimeFigureOut">
               <a:rPr lang="nl-NL" smtClean="0"/>
-              <a:t>7-3-2017</a:t>
+              <a:t>10-3-2017</a:t>
             </a:fld>
             <a:endParaRPr lang="nl-NL"/>
           </a:p>
@@ -2086,7 +2083,7 @@
           <a:p>
             <a:fld id="{89D9F315-EBDF-47D1-A5C3-A0643337B848}" type="slidenum">
               <a:rPr lang="nl-NL" smtClean="0"/>
-              <a:t>‹#›</a:t>
+              <a:t>‹nr.›</a:t>
             </a:fld>
             <a:endParaRPr lang="nl-NL"/>
           </a:p>
@@ -2161,7 +2158,7 @@
           <a:p>
             <a:fld id="{BE740BB2-E612-45CF-96A8-BE4D5B63A40C}" type="datetimeFigureOut">
               <a:rPr lang="nl-NL" smtClean="0"/>
-              <a:t>7-3-2017</a:t>
+              <a:t>10-3-2017</a:t>
             </a:fld>
             <a:endParaRPr lang="nl-NL"/>
           </a:p>
@@ -2203,7 +2200,7 @@
           <a:p>
             <a:fld id="{89D9F315-EBDF-47D1-A5C3-A0643337B848}" type="slidenum">
               <a:rPr lang="nl-NL" smtClean="0"/>
-              <a:t>‹#›</a:t>
+              <a:t>‹nr.›</a:t>
             </a:fld>
             <a:endParaRPr lang="nl-NL"/>
           </a:p>
@@ -2256,7 +2253,7 @@
           <a:p>
             <a:fld id="{BE740BB2-E612-45CF-96A8-BE4D5B63A40C}" type="datetimeFigureOut">
               <a:rPr lang="nl-NL" smtClean="0"/>
-              <a:t>7-3-2017</a:t>
+              <a:t>10-3-2017</a:t>
             </a:fld>
             <a:endParaRPr lang="nl-NL"/>
           </a:p>
@@ -2308,7 +2305,7 @@
           <a:p>
             <a:fld id="{89D9F315-EBDF-47D1-A5C3-A0643337B848}" type="slidenum">
               <a:rPr lang="nl-NL" smtClean="0"/>
-              <a:t>‹#›</a:t>
+              <a:t>‹nr.›</a:t>
             </a:fld>
             <a:endParaRPr lang="nl-NL"/>
           </a:p>
@@ -2534,7 +2531,7 @@
           <a:p>
             <a:fld id="{BE740BB2-E612-45CF-96A8-BE4D5B63A40C}" type="datetimeFigureOut">
               <a:rPr lang="nl-NL" smtClean="0"/>
-              <a:t>7-3-2017</a:t>
+              <a:t>10-3-2017</a:t>
             </a:fld>
             <a:endParaRPr lang="nl-NL"/>
           </a:p>
@@ -2594,7 +2591,7 @@
           <a:p>
             <a:fld id="{89D9F315-EBDF-47D1-A5C3-A0643337B848}" type="slidenum">
               <a:rPr lang="nl-NL" smtClean="0"/>
-              <a:t>‹#›</a:t>
+              <a:t>‹nr.›</a:t>
             </a:fld>
             <a:endParaRPr lang="nl-NL"/>
           </a:p>
@@ -2786,7 +2783,7 @@
           <a:p>
             <a:fld id="{BE740BB2-E612-45CF-96A8-BE4D5B63A40C}" type="datetimeFigureOut">
               <a:rPr lang="nl-NL" smtClean="0"/>
-              <a:t>7-3-2017</a:t>
+              <a:t>10-3-2017</a:t>
             </a:fld>
             <a:endParaRPr lang="nl-NL"/>
           </a:p>
@@ -2846,7 +2843,7 @@
           <a:p>
             <a:fld id="{89D9F315-EBDF-47D1-A5C3-A0643337B848}" type="slidenum">
               <a:rPr lang="nl-NL" smtClean="0"/>
-              <a:t>‹#›</a:t>
+              <a:t>‹nr.›</a:t>
             </a:fld>
             <a:endParaRPr lang="nl-NL"/>
           </a:p>
@@ -3158,7 +3155,7 @@
           <a:p>
             <a:fld id="{BE740BB2-E612-45CF-96A8-BE4D5B63A40C}" type="datetimeFigureOut">
               <a:rPr lang="nl-NL" smtClean="0"/>
-              <a:t>7-3-2017</a:t>
+              <a:t>10-3-2017</a:t>
             </a:fld>
             <a:endParaRPr lang="nl-NL"/>
           </a:p>
@@ -3232,7 +3229,7 @@
           <a:p>
             <a:fld id="{89D9F315-EBDF-47D1-A5C3-A0643337B848}" type="slidenum">
               <a:rPr lang="nl-NL" smtClean="0"/>
-              <a:t>‹#›</a:t>
+              <a:t>‹nr.›</a:t>
             </a:fld>
             <a:endParaRPr lang="nl-NL"/>
           </a:p>
@@ -3669,156 +3666,6 @@
 </p:sld>
 </file>
 
-<file path=ppt/slides/slide10.xml><?xml version="1.0" encoding="utf-8"?>
-<p:sld xmlns:a="http://schemas.openxmlformats.org/drawingml/2006/main" xmlns:r="http://schemas.openxmlformats.org/officeDocument/2006/relationships" xmlns:p="http://schemas.openxmlformats.org/presentationml/2006/main">
-  <p:cSld>
-    <p:spTree>
-      <p:nvGrpSpPr>
-        <p:cNvPr id="1" name=""/>
-        <p:cNvGrpSpPr/>
-        <p:nvPr/>
-      </p:nvGrpSpPr>
-      <p:grpSpPr>
-        <a:xfrm>
-          <a:off x="0" y="0"/>
-          <a:ext cx="0" cy="0"/>
-          <a:chOff x="0" y="0"/>
-          <a:chExt cx="0" cy="0"/>
-        </a:xfrm>
-      </p:grpSpPr>
-      <p:sp>
-        <p:nvSpPr>
-          <p:cNvPr id="2" name="Title 1"/>
-          <p:cNvSpPr>
-            <a:spLocks noGrp="1"/>
-          </p:cNvSpPr>
-          <p:nvPr>
-            <p:ph type="title"/>
-          </p:nvPr>
-        </p:nvSpPr>
-        <p:spPr/>
-        <p:txBody>
-          <a:bodyPr/>
-          <a:lstStyle/>
-          <a:p>
-            <a:endParaRPr lang="en-US"/>
-          </a:p>
-        </p:txBody>
-      </p:sp>
-      <p:pic>
-        <p:nvPicPr>
-          <p:cNvPr id="4" name="Content Placeholder 3"/>
-          <p:cNvPicPr>
-            <a:picLocks noGrp="1" noChangeAspect="1"/>
-          </p:cNvPicPr>
-          <p:nvPr>
-            <p:ph idx="1"/>
-          </p:nvPr>
-        </p:nvPicPr>
-        <p:blipFill>
-          <a:blip r:embed="rId2"/>
-          <a:stretch>
-            <a:fillRect/>
-          </a:stretch>
-        </p:blipFill>
-        <p:spPr>
-          <a:xfrm>
-            <a:off x="2792910" y="1882775"/>
-            <a:ext cx="3558180" cy="4572000"/>
-          </a:xfrm>
-          <a:prstGeom prst="rect">
-            <a:avLst/>
-          </a:prstGeom>
-        </p:spPr>
-      </p:pic>
-    </p:spTree>
-    <p:extLst>
-      <p:ext uri="{BB962C8B-B14F-4D97-AF65-F5344CB8AC3E}">
-        <p14:creationId xmlns:p14="http://schemas.microsoft.com/office/powerpoint/2010/main" val="575007379"/>
-      </p:ext>
-    </p:extLst>
-  </p:cSld>
-  <p:clrMapOvr>
-    <a:masterClrMapping/>
-  </p:clrMapOvr>
-</p:sld>
-</file>
-
-<file path=ppt/slides/slide11.xml><?xml version="1.0" encoding="utf-8"?>
-<p:sld xmlns:a="http://schemas.openxmlformats.org/drawingml/2006/main" xmlns:r="http://schemas.openxmlformats.org/officeDocument/2006/relationships" xmlns:p="http://schemas.openxmlformats.org/presentationml/2006/main">
-  <p:cSld>
-    <p:spTree>
-      <p:nvGrpSpPr>
-        <p:cNvPr id="1" name=""/>
-        <p:cNvGrpSpPr/>
-        <p:nvPr/>
-      </p:nvGrpSpPr>
-      <p:grpSpPr>
-        <a:xfrm>
-          <a:off x="0" y="0"/>
-          <a:ext cx="0" cy="0"/>
-          <a:chOff x="0" y="0"/>
-          <a:chExt cx="0" cy="0"/>
-        </a:xfrm>
-      </p:grpSpPr>
-      <p:sp>
-        <p:nvSpPr>
-          <p:cNvPr id="2" name="Title 1"/>
-          <p:cNvSpPr>
-            <a:spLocks noGrp="1"/>
-          </p:cNvSpPr>
-          <p:nvPr>
-            <p:ph type="title"/>
-          </p:nvPr>
-        </p:nvSpPr>
-        <p:spPr/>
-        <p:txBody>
-          <a:bodyPr/>
-          <a:lstStyle/>
-          <a:p>
-            <a:endParaRPr lang="en-US"/>
-          </a:p>
-        </p:txBody>
-      </p:sp>
-      <p:pic>
-        <p:nvPicPr>
-          <p:cNvPr id="4" name="Content Placeholder 3"/>
-          <p:cNvPicPr>
-            <a:picLocks noGrp="1" noChangeAspect="1"/>
-          </p:cNvPicPr>
-          <p:nvPr>
-            <p:ph idx="1"/>
-          </p:nvPr>
-        </p:nvPicPr>
-        <p:blipFill>
-          <a:blip r:embed="rId2"/>
-          <a:stretch>
-            <a:fillRect/>
-          </a:stretch>
-        </p:blipFill>
-        <p:spPr>
-          <a:xfrm>
-            <a:off x="1575309" y="1882775"/>
-            <a:ext cx="5993381" cy="4572000"/>
-          </a:xfrm>
-          <a:prstGeom prst="rect">
-            <a:avLst/>
-          </a:prstGeom>
-        </p:spPr>
-      </p:pic>
-    </p:spTree>
-    <p:extLst>
-      <p:ext uri="{BB962C8B-B14F-4D97-AF65-F5344CB8AC3E}">
-        <p14:creationId xmlns:p14="http://schemas.microsoft.com/office/powerpoint/2010/main" val="1030236662"/>
-      </p:ext>
-    </p:extLst>
-  </p:cSld>
-  <p:clrMapOvr>
-    <a:masterClrMapping/>
-  </p:clrMapOvr>
-</p:sld>
-</file>
-
 <file path=ppt/slides/slide2.xml><?xml version="1.0" encoding="utf-8"?>
 <p:sld xmlns:a="http://schemas.openxmlformats.org/drawingml/2006/main" xmlns:r="http://schemas.openxmlformats.org/officeDocument/2006/relationships" xmlns:p="http://schemas.openxmlformats.org/presentationml/2006/main">
   <p:cSld>
@@ -3876,21 +3723,42 @@
           <a:p>
             <a:r>
               <a:rPr lang="en-US" dirty="0"/>
-              <a:t>Make a project plan</a:t>
-            </a:r>
-          </a:p>
-          <a:p>
+              <a:t>Find out which people to contact</a:t>
+            </a:r>
+            <a:endParaRPr lang="nl-NL" dirty="0"/>
+          </a:p>
+          <a:p>
+            <a:pPr lvl="1"/>
             <a:r>
               <a:rPr lang="en-US" dirty="0"/>
-              <a:t>Collect evidence</a:t>
+              <a:t>Contacted them</a:t>
             </a:r>
           </a:p>
           <a:p>
             <a:r>
               <a:rPr lang="en-US" dirty="0"/>
-              <a:t>Start researching technologies</a:t>
-            </a:r>
-            <a:endParaRPr lang="nl-NL" dirty="0"/>
+              <a:t>Find out material costs</a:t>
+            </a:r>
+          </a:p>
+          <a:p>
+            <a:pPr lvl="1"/>
+            <a:r>
+              <a:rPr lang="en-US" dirty="0"/>
+              <a:t>Made cost analysis</a:t>
+            </a:r>
+          </a:p>
+          <a:p>
+            <a:r>
+              <a:rPr lang="en-US" dirty="0"/>
+              <a:t>Feedback was received last week from monsieur</a:t>
+            </a:r>
+          </a:p>
+          <a:p>
+            <a:pPr lvl="1"/>
+            <a:r>
+              <a:rPr lang="en-US" dirty="0"/>
+              <a:t>Implemented this feedback </a:t>
+            </a:r>
           </a:p>
         </p:txBody>
       </p:sp>
@@ -3970,40 +3838,13 @@
           <a:p>
             <a:r>
               <a:rPr lang="en-US" dirty="0"/>
-              <a:t>Used creativity techniques</a:t>
-            </a:r>
-          </a:p>
-          <a:p>
-            <a:pPr lvl="1"/>
+              <a:t>Online research regarding materials &amp; costs</a:t>
+            </a:r>
+          </a:p>
+          <a:p>
             <a:r>
               <a:rPr lang="en-US" dirty="0"/>
-              <a:t>SCAMPER</a:t>
-            </a:r>
-          </a:p>
-          <a:p>
-            <a:pPr lvl="1"/>
-            <a:r>
-              <a:rPr lang="en-US" dirty="0"/>
-              <a:t>Worst case scenario</a:t>
-            </a:r>
-          </a:p>
-          <a:p>
-            <a:pPr lvl="1"/>
-            <a:r>
-              <a:rPr lang="en-US" dirty="0"/>
-              <a:t>Progressive abstraction</a:t>
-            </a:r>
-          </a:p>
-          <a:p>
-            <a:r>
-              <a:rPr lang="en-US" dirty="0"/>
-              <a:t>Made pictures of evidence throughout the city</a:t>
-            </a:r>
-          </a:p>
-          <a:p>
-            <a:r>
-              <a:rPr lang="en-US" dirty="0"/>
-              <a:t>Technologies were researched online</a:t>
+              <a:t>Brainstorming on whiteboard</a:t>
             </a:r>
           </a:p>
         </p:txBody>
@@ -4077,22 +3918,111 @@
           <a:lstStyle/>
           <a:p>
             <a:r>
-              <a:rPr lang="en-US" dirty="0"/>
-              <a:t>Creativity techniques lead to some new insights</a:t>
-            </a:r>
-          </a:p>
-          <a:p>
-            <a:r>
-              <a:rPr lang="en-US" dirty="0"/>
-              <a:t>Initial research lead to a shortlist of sensor technologies</a:t>
-            </a:r>
-          </a:p>
-          <a:p>
-            <a:r>
-              <a:rPr lang="en-US" dirty="0"/>
-              <a:t>Enough evidence to make a solid case was collected</a:t>
+              <a:rPr lang="nl-NL" dirty="0" err="1"/>
+              <a:t>Managed</a:t>
+            </a:r>
+            <a:r>
+              <a:rPr lang="nl-NL" dirty="0"/>
+              <a:t> </a:t>
+            </a:r>
+            <a:r>
+              <a:rPr lang="nl-NL" dirty="0" err="1"/>
+              <a:t>to</a:t>
+            </a:r>
+            <a:r>
+              <a:rPr lang="nl-NL" dirty="0"/>
+              <a:t> get multiple </a:t>
+            </a:r>
+            <a:r>
+              <a:rPr lang="nl-NL" dirty="0" err="1"/>
+              <a:t>contacts</a:t>
+            </a:r>
+            <a:r>
+              <a:rPr lang="nl-NL" dirty="0"/>
+              <a:t>, but </a:t>
+            </a:r>
+            <a:r>
+              <a:rPr lang="nl-NL" dirty="0" err="1"/>
+              <a:t>unable</a:t>
+            </a:r>
+            <a:r>
+              <a:rPr lang="nl-NL" dirty="0"/>
+              <a:t> </a:t>
+            </a:r>
+            <a:r>
+              <a:rPr lang="nl-NL" dirty="0" err="1"/>
+              <a:t>to</a:t>
+            </a:r>
+            <a:r>
+              <a:rPr lang="nl-NL" dirty="0"/>
+              <a:t> </a:t>
+            </a:r>
+            <a:r>
+              <a:rPr lang="nl-NL" dirty="0" err="1"/>
+              <a:t>reach</a:t>
+            </a:r>
+            <a:r>
+              <a:rPr lang="nl-NL" dirty="0"/>
+              <a:t> </a:t>
+            </a:r>
+            <a:r>
+              <a:rPr lang="nl-NL" dirty="0" err="1"/>
+              <a:t>them</a:t>
+            </a:r>
+            <a:r>
+              <a:rPr lang="nl-NL" dirty="0"/>
+              <a:t> </a:t>
+            </a:r>
+            <a:r>
+              <a:rPr lang="nl-NL" dirty="0" err="1"/>
+              <a:t>yet</a:t>
             </a:r>
             <a:endParaRPr lang="nl-NL" dirty="0"/>
+          </a:p>
+          <a:p>
+            <a:r>
+              <a:rPr lang="nl-NL" dirty="0"/>
+              <a:t>Brief </a:t>
+            </a:r>
+            <a:r>
+              <a:rPr lang="nl-NL" dirty="0" err="1"/>
+              <a:t>overview</a:t>
+            </a:r>
+            <a:r>
+              <a:rPr lang="nl-NL" dirty="0"/>
+              <a:t> of </a:t>
+            </a:r>
+            <a:r>
+              <a:rPr lang="nl-NL" dirty="0" err="1"/>
+              <a:t>required</a:t>
+            </a:r>
+            <a:r>
+              <a:rPr lang="nl-NL" dirty="0"/>
+              <a:t> </a:t>
+            </a:r>
+            <a:r>
+              <a:rPr lang="nl-NL" dirty="0" err="1"/>
+              <a:t>materials</a:t>
+            </a:r>
+            <a:r>
+              <a:rPr lang="nl-NL" dirty="0"/>
+              <a:t> &amp; </a:t>
+            </a:r>
+            <a:r>
+              <a:rPr lang="nl-NL" dirty="0" err="1"/>
+              <a:t>costs</a:t>
+            </a:r>
+            <a:endParaRPr lang="nl-NL" dirty="0"/>
+          </a:p>
+          <a:p>
+            <a:r>
+              <a:rPr lang="nl-NL" dirty="0" err="1"/>
+              <a:t>Updated</a:t>
+            </a:r>
+            <a:r>
+              <a:rPr lang="nl-NL" dirty="0"/>
+              <a:t> project plan</a:t>
+            </a:r>
           </a:p>
         </p:txBody>
       </p:sp>
@@ -4166,23 +4096,14 @@
           <a:p>
             <a:r>
               <a:rPr lang="en-US" dirty="0"/>
-              <a:t>Project planning didn’t suffice yet</a:t>
+              <a:t>Voicemail</a:t>
             </a:r>
           </a:p>
           <a:p>
             <a:r>
               <a:rPr lang="en-US" dirty="0"/>
-              <a:t>We had to wait for contact with the local government</a:t>
-            </a:r>
-          </a:p>
-          <a:p>
-            <a:r>
-              <a:rPr lang="en-US" dirty="0"/>
-              <a:t>Creativity techniques were quite difficult to use sometimes</a:t>
-            </a:r>
-          </a:p>
-          <a:p>
-            <a:endParaRPr lang="nl-NL" dirty="0"/>
+              <a:t>Difficult to find the proper materials(I²C etc.)</a:t>
+            </a:r>
           </a:p>
         </p:txBody>
       </p:sp>
@@ -4256,13 +4177,13 @@
           <a:p>
             <a:r>
               <a:rPr lang="en-US" dirty="0"/>
-              <a:t>Getting in touch with the stakeholders needs to be done as soon as possible</a:t>
+              <a:t>Hard to reach civil servants</a:t>
             </a:r>
           </a:p>
           <a:p>
             <a:r>
               <a:rPr lang="en-US" dirty="0"/>
-              <a:t>We learned how to use creativity techniques in our own context, and we found out their uses.</a:t>
+              <a:t>Materials cheaper than we thought</a:t>
             </a:r>
           </a:p>
           <a:p>
@@ -4352,32 +4273,26 @@
           <a:p>
             <a:r>
               <a:rPr lang="en-US" dirty="0"/>
-              <a:t>Get in touch with the local government and van </a:t>
-            </a:r>
-            <a:r>
-              <a:rPr lang="en-US" dirty="0" err="1"/>
-              <a:t>Gansewinkel</a:t>
-            </a:r>
-            <a:endParaRPr lang="en-US" dirty="0"/>
+              <a:t>Start designing test application</a:t>
+            </a:r>
           </a:p>
           <a:p>
             <a:r>
               <a:rPr lang="en-US" dirty="0"/>
-              <a:t>Implement feedback on the project plan</a:t>
+              <a:t>Architecture mock-ups</a:t>
             </a:r>
           </a:p>
           <a:p>
             <a:r>
               <a:rPr lang="en-US" dirty="0"/>
-              <a:t>Set up a budget request for the sensor technologies</a:t>
+              <a:t>Research technologies</a:t>
             </a:r>
           </a:p>
           <a:p>
             <a:r>
               <a:rPr lang="en-US" dirty="0"/>
-              <a:t>More goals will      	 be defined this morning</a:t>
-            </a:r>
-            <a:endParaRPr lang="nl-NL" dirty="0"/>
+              <a:t>Start preparing interviews</a:t>
+            </a:r>
           </a:p>
         </p:txBody>
       </p:sp>
@@ -4451,44 +4366,24 @@
           <a:p>
             <a:r>
               <a:rPr lang="en-US" dirty="0"/>
-              <a:t>Find out which people to contact</a:t>
-            </a:r>
-            <a:endParaRPr lang="nl-NL" dirty="0"/>
-          </a:p>
-          <a:p>
-            <a:pPr lvl="1"/>
+              <a:t>More brainstorming on whiteboard</a:t>
+            </a:r>
+          </a:p>
+          <a:p>
             <a:r>
               <a:rPr lang="en-US" dirty="0"/>
-              <a:t>Contact them</a:t>
+              <a:t>Online research</a:t>
             </a:r>
           </a:p>
           <a:p>
             <a:r>
               <a:rPr lang="en-US" dirty="0"/>
-              <a:t>Find out material costs</a:t>
-            </a:r>
-          </a:p>
-          <a:p>
-            <a:pPr lvl="1"/>
-            <a:r>
-              <a:rPr lang="en-US" dirty="0"/>
-              <a:t>Are these costs within budget?</a:t>
-            </a:r>
-          </a:p>
-          <a:p>
-            <a:r>
-              <a:rPr lang="en-US" dirty="0"/>
-              <a:t>Feedback was received last week from monsieur</a:t>
-            </a:r>
-          </a:p>
-          <a:p>
-            <a:pPr lvl="1"/>
-            <a:r>
-              <a:rPr lang="en-US" dirty="0"/>
-              <a:t>Implement this feedback </a:t>
-            </a:r>
-          </a:p>
-          <a:p>
+              <a:t>Use </a:t>
+            </a:r>
+            <a:r>
+              <a:rPr lang="en-US"/>
+              <a:t>available knowledge</a:t>
+            </a:r>
             <a:endParaRPr lang="en-US" dirty="0"/>
           </a:p>
         </p:txBody>
@@ -4497,81 +4392,6 @@
     <p:extLst>
       <p:ext uri="{BB962C8B-B14F-4D97-AF65-F5344CB8AC3E}">
         <p14:creationId xmlns:p14="http://schemas.microsoft.com/office/powerpoint/2010/main" val="3203515607"/>
-      </p:ext>
-    </p:extLst>
-  </p:cSld>
-  <p:clrMapOvr>
-    <a:masterClrMapping/>
-  </p:clrMapOvr>
-</p:sld>
-</file>
-
-<file path=ppt/slides/slide9.xml><?xml version="1.0" encoding="utf-8"?>
-<p:sld xmlns:a="http://schemas.openxmlformats.org/drawingml/2006/main" xmlns:r="http://schemas.openxmlformats.org/officeDocument/2006/relationships" xmlns:p="http://schemas.openxmlformats.org/presentationml/2006/main">
-  <p:cSld>
-    <p:spTree>
-      <p:nvGrpSpPr>
-        <p:cNvPr id="1" name=""/>
-        <p:cNvGrpSpPr/>
-        <p:nvPr/>
-      </p:nvGrpSpPr>
-      <p:grpSpPr>
-        <a:xfrm>
-          <a:off x="0" y="0"/>
-          <a:ext cx="0" cy="0"/>
-          <a:chOff x="0" y="0"/>
-          <a:chExt cx="0" cy="0"/>
-        </a:xfrm>
-      </p:grpSpPr>
-      <p:sp>
-        <p:nvSpPr>
-          <p:cNvPr id="2" name="Title 1"/>
-          <p:cNvSpPr>
-            <a:spLocks noGrp="1"/>
-          </p:cNvSpPr>
-          <p:nvPr>
-            <p:ph type="title"/>
-          </p:nvPr>
-        </p:nvSpPr>
-        <p:spPr/>
-        <p:txBody>
-          <a:bodyPr/>
-          <a:lstStyle/>
-          <a:p>
-            <a:endParaRPr lang="en-US"/>
-          </a:p>
-        </p:txBody>
-      </p:sp>
-      <p:pic>
-        <p:nvPicPr>
-          <p:cNvPr id="6" name="Content Placeholder 5"/>
-          <p:cNvPicPr>
-            <a:picLocks noGrp="1" noChangeAspect="1"/>
-          </p:cNvPicPr>
-          <p:nvPr>
-            <p:ph idx="1"/>
-          </p:nvPr>
-        </p:nvPicPr>
-        <p:blipFill>
-          <a:blip r:embed="rId2"/>
-          <a:stretch>
-            <a:fillRect/>
-          </a:stretch>
-        </p:blipFill>
-        <p:spPr>
-          <a:xfrm>
-            <a:off x="1043608" y="1484784"/>
-            <a:ext cx="6609905" cy="4326483"/>
-          </a:xfrm>
-          <a:prstGeom prst="rect">
-            <a:avLst/>
-          </a:prstGeom>
-        </p:spPr>
-      </p:pic>
-    </p:spTree>
-    <p:extLst>
-      <p:ext uri="{BB962C8B-B14F-4D97-AF65-F5344CB8AC3E}">
-        <p14:creationId xmlns:p14="http://schemas.microsoft.com/office/powerpoint/2010/main" val="2788243914"/>
       </p:ext>
     </p:extLst>
   </p:cSld>

</xml_diff>